<commit_message>
upravene materialy na 2. prednasku
</commit_message>
<xml_diff>
--- a/prednasky/02/1 Reprodukovatelny vyskum.pptx
+++ b/prednasky/02/1 Reprodukovatelny vyskum.pptx
@@ -7,17 +7,18 @@
   <p:sldIdLst>
     <p:sldId id="256" r:id="rId2"/>
     <p:sldId id="257" r:id="rId3"/>
-    <p:sldId id="258" r:id="rId4"/>
-    <p:sldId id="259" r:id="rId5"/>
-    <p:sldId id="260" r:id="rId6"/>
-    <p:sldId id="261" r:id="rId7"/>
-    <p:sldId id="263" r:id="rId8"/>
-    <p:sldId id="262" r:id="rId9"/>
-    <p:sldId id="264" r:id="rId10"/>
-    <p:sldId id="265" r:id="rId11"/>
-    <p:sldId id="266" r:id="rId12"/>
-    <p:sldId id="268" r:id="rId13"/>
-    <p:sldId id="267" r:id="rId14"/>
+    <p:sldId id="269" r:id="rId4"/>
+    <p:sldId id="258" r:id="rId5"/>
+    <p:sldId id="259" r:id="rId6"/>
+    <p:sldId id="260" r:id="rId7"/>
+    <p:sldId id="261" r:id="rId8"/>
+    <p:sldId id="263" r:id="rId9"/>
+    <p:sldId id="262" r:id="rId10"/>
+    <p:sldId id="264" r:id="rId11"/>
+    <p:sldId id="265" r:id="rId12"/>
+    <p:sldId id="266" r:id="rId13"/>
+    <p:sldId id="268" r:id="rId14"/>
+    <p:sldId id="267" r:id="rId15"/>
   </p:sldIdLst>
   <p:sldSz cx="12192000" cy="6858000"/>
   <p:notesSz cx="6858000" cy="9144000"/>
@@ -116,6 +117,11 @@
       </a:defRPr>
     </a:lvl9pPr>
   </p:defaultTextStyle>
+  <p:extLst>
+    <p:ext uri="{EFAFB233-063F-42B5-8137-9DF3F51BA10A}">
+      <p15:sldGuideLst xmlns:p15="http://schemas.microsoft.com/office/powerpoint/2012/main"/>
+    </p:ext>
+  </p:extLst>
 </p:presentation>
 </file>
 
@@ -250,7 +256,7 @@
           <a:p>
             <a:fld id="{69DEC26B-304B-48AB-AE73-570DAA26D5D5}" type="datetimeFigureOut">
               <a:rPr lang="en-US" smtClean="0"/>
-              <a:t>2018-09-23</a:t>
+              <a:t>2018-09-27</a:t>
             </a:fld>
             <a:endParaRPr lang="en-US"/>
           </a:p>
@@ -468,7 +474,7 @@
           <a:p>
             <a:fld id="{69DEC26B-304B-48AB-AE73-570DAA26D5D5}" type="datetimeFigureOut">
               <a:rPr lang="en-US" smtClean="0"/>
-              <a:t>2018-09-23</a:t>
+              <a:t>2018-09-27</a:t>
             </a:fld>
             <a:endParaRPr lang="en-US"/>
           </a:p>
@@ -696,7 +702,7 @@
           <a:p>
             <a:fld id="{69DEC26B-304B-48AB-AE73-570DAA26D5D5}" type="datetimeFigureOut">
               <a:rPr lang="en-US" smtClean="0"/>
-              <a:t>2018-09-23</a:t>
+              <a:t>2018-09-27</a:t>
             </a:fld>
             <a:endParaRPr lang="en-US"/>
           </a:p>
@@ -914,7 +920,7 @@
           <a:p>
             <a:fld id="{69DEC26B-304B-48AB-AE73-570DAA26D5D5}" type="datetimeFigureOut">
               <a:rPr lang="en-US" smtClean="0"/>
-              <a:t>2018-09-23</a:t>
+              <a:t>2018-09-27</a:t>
             </a:fld>
             <a:endParaRPr lang="en-US"/>
           </a:p>
@@ -1158,7 +1164,7 @@
           <a:p>
             <a:fld id="{69DEC26B-304B-48AB-AE73-570DAA26D5D5}" type="datetimeFigureOut">
               <a:rPr lang="en-US" smtClean="0"/>
-              <a:t>2018-09-23</a:t>
+              <a:t>2018-09-27</a:t>
             </a:fld>
             <a:endParaRPr lang="en-US"/>
           </a:p>
@@ -1390,7 +1396,7 @@
           <a:p>
             <a:fld id="{69DEC26B-304B-48AB-AE73-570DAA26D5D5}" type="datetimeFigureOut">
               <a:rPr lang="en-US" smtClean="0"/>
-              <a:t>2018-09-23</a:t>
+              <a:t>2018-09-27</a:t>
             </a:fld>
             <a:endParaRPr lang="en-US"/>
           </a:p>
@@ -1757,7 +1763,7 @@
           <a:p>
             <a:fld id="{69DEC26B-304B-48AB-AE73-570DAA26D5D5}" type="datetimeFigureOut">
               <a:rPr lang="en-US" smtClean="0"/>
-              <a:t>2018-09-23</a:t>
+              <a:t>2018-09-27</a:t>
             </a:fld>
             <a:endParaRPr lang="en-US"/>
           </a:p>
@@ -1875,7 +1881,7 @@
           <a:p>
             <a:fld id="{69DEC26B-304B-48AB-AE73-570DAA26D5D5}" type="datetimeFigureOut">
               <a:rPr lang="en-US" smtClean="0"/>
-              <a:t>2018-09-23</a:t>
+              <a:t>2018-09-27</a:t>
             </a:fld>
             <a:endParaRPr lang="en-US"/>
           </a:p>
@@ -1970,7 +1976,7 @@
           <a:p>
             <a:fld id="{69DEC26B-304B-48AB-AE73-570DAA26D5D5}" type="datetimeFigureOut">
               <a:rPr lang="en-US" smtClean="0"/>
-              <a:t>2018-09-23</a:t>
+              <a:t>2018-09-27</a:t>
             </a:fld>
             <a:endParaRPr lang="en-US"/>
           </a:p>
@@ -2295,7 +2301,7 @@
           <a:p>
             <a:fld id="{69DEC26B-304B-48AB-AE73-570DAA26D5D5}" type="datetimeFigureOut">
               <a:rPr lang="en-US" smtClean="0"/>
-              <a:t>2018-09-23</a:t>
+              <a:t>2018-09-27</a:t>
             </a:fld>
             <a:endParaRPr lang="en-US"/>
           </a:p>
@@ -2600,7 +2606,7 @@
           <a:p>
             <a:fld id="{69DEC26B-304B-48AB-AE73-570DAA26D5D5}" type="datetimeFigureOut">
               <a:rPr lang="en-US" smtClean="0"/>
-              <a:t>2018-09-23</a:t>
+              <a:t>2018-09-27</a:t>
             </a:fld>
             <a:endParaRPr lang="en-US"/>
           </a:p>
@@ -2861,7 +2867,7 @@
           <a:p>
             <a:fld id="{69DEC26B-304B-48AB-AE73-570DAA26D5D5}" type="datetimeFigureOut">
               <a:rPr lang="en-US" smtClean="0"/>
-              <a:t>2018-09-23</a:t>
+              <a:t>2018-09-27</a:t>
             </a:fld>
             <a:endParaRPr lang="en-US"/>
           </a:p>
@@ -3359,6 +3365,13 @@
   <p:clrMapOvr>
     <a:masterClrMapping/>
   </p:clrMapOvr>
+  <p:timing>
+    <p:tnLst>
+      <p:par>
+        <p:cTn id="1" dur="indefinite" restart="never" nodeType="tmRoot"/>
+      </p:par>
+    </p:tnLst>
+  </p:timing>
 </p:sld>
 </file>
 
@@ -3394,6 +3407,18 @@
           <a:bodyPr/>
           <a:lstStyle/>
           <a:p>
+            <a:r>
+              <a:rPr lang="sk-SK" dirty="0" smtClean="0"/>
+              <a:t>Príklad </a:t>
+            </a:r>
+            <a:r>
+              <a:rPr lang="sk-SK" dirty="0" err="1" smtClean="0"/>
+              <a:t>Jupyter</a:t>
+            </a:r>
+            <a:r>
+              <a:rPr lang="sk-SK" dirty="0" smtClean="0"/>
+              <a:t> notebooku</a:t>
+            </a:r>
             <a:endParaRPr lang="en-US" dirty="0"/>
           </a:p>
         </p:txBody>
@@ -3417,9 +3442,28 @@
               <a:buNone/>
             </a:pPr>
             <a:r>
-              <a:rPr lang="sk-SK" dirty="0" smtClean="0"/>
-              <a:t>V tomto dokumente je celá analýza, ktorú si vie ktokoľvek prečítať a znovu spustiť</a:t>
-            </a:r>
+              <a:rPr lang="sk-SK" dirty="0" err="1" smtClean="0"/>
+              <a:t>Repo</a:t>
+            </a:r>
+            <a:r>
+              <a:rPr lang="en-GB" dirty="0" smtClean="0"/>
+              <a:t>z</a:t>
+            </a:r>
+            <a:r>
+              <a:rPr lang="sk-SK" dirty="0" err="1" smtClean="0"/>
+              <a:t>itár</a:t>
+            </a:r>
+            <a:r>
+              <a:rPr lang="sk-SK" dirty="0" smtClean="0"/>
+              <a:t>: </a:t>
+            </a:r>
+            <a:r>
+              <a:rPr lang="en-US" dirty="0" smtClean="0">
+                <a:hlinkClick r:id="rId2"/>
+              </a:rPr>
+              <a:t>https://github.com/donnemartin/data-science-ipython-notebooks</a:t>
+            </a:r>
+            <a:endParaRPr lang="en-US" dirty="0" smtClean="0"/>
           </a:p>
           <a:p>
             <a:pPr marL="0" indent="0">
@@ -3427,55 +3471,122 @@
             </a:pPr>
             <a:r>
               <a:rPr lang="sk-SK" dirty="0" smtClean="0"/>
-              <a:t>Vidí</a:t>
-            </a:r>
-            <a:r>
-              <a:rPr lang="sk-SK" dirty="0"/>
-              <a:t>:</a:t>
-            </a:r>
+              <a:t>Notebook: </a:t>
+            </a:r>
+            <a:r>
+              <a:rPr lang="sk-SK" dirty="0" smtClean="0">
+                <a:hlinkClick r:id="rId3"/>
+              </a:rPr>
+              <a:t>https://github.com/donnemartin/data-science-ipython-notebooks/blob/master/kaggle/titanic.ipynb</a:t>
+            </a:r>
+            <a:endParaRPr lang="en-GB" dirty="0" smtClean="0"/>
+          </a:p>
+          <a:p>
+            <a:pPr marL="0" indent="0">
+              <a:buNone/>
+            </a:pPr>
             <a:endParaRPr lang="sk-SK" dirty="0" smtClean="0"/>
           </a:p>
           <a:p>
-            <a:pPr lvl="1"/>
-            <a:r>
-              <a:rPr lang="sk-SK" dirty="0" smtClean="0"/>
-              <a:t>Výsledky</a:t>
-            </a:r>
-          </a:p>
-          <a:p>
-            <a:pPr lvl="1"/>
-            <a:r>
-              <a:rPr lang="sk-SK" dirty="0" smtClean="0"/>
-              <a:t>Postup</a:t>
-            </a:r>
-          </a:p>
-          <a:p>
-            <a:pPr lvl="1"/>
-            <a:r>
-              <a:rPr lang="sk-SK" dirty="0" smtClean="0"/>
-              <a:t>Komentáre a interpretáciu</a:t>
-            </a:r>
-          </a:p>
-          <a:p>
-            <a:pPr lvl="1"/>
-            <a:r>
-              <a:rPr lang="sk-SK" dirty="0" smtClean="0"/>
-              <a:t>Prácu s dátami</a:t>
-            </a:r>
-            <a:endParaRPr lang="en-US" dirty="0"/>
+            <a:pPr marL="0" indent="0">
+              <a:buNone/>
+            </a:pPr>
+            <a:endParaRPr lang="en-GB" dirty="0"/>
+          </a:p>
+          <a:p>
+            <a:pPr marL="0" indent="0">
+              <a:buNone/>
+            </a:pPr>
+            <a:r>
+              <a:rPr lang="en-GB" sz="1800" dirty="0" err="1" smtClean="0"/>
+              <a:t>Namiesto</a:t>
+            </a:r>
+            <a:r>
+              <a:rPr lang="en-GB" sz="1800" dirty="0" smtClean="0"/>
+              <a:t> python 2 </a:t>
+            </a:r>
+            <a:r>
+              <a:rPr lang="en-GB" sz="1800" dirty="0" err="1" smtClean="0"/>
+              <a:t>pou</a:t>
+            </a:r>
+            <a:r>
+              <a:rPr lang="sk-SK" sz="1800" dirty="0" err="1" smtClean="0"/>
+              <a:t>ží</a:t>
+            </a:r>
+            <a:r>
+              <a:rPr lang="en-GB" sz="1800" dirty="0" err="1" smtClean="0"/>
+              <a:t>vam</a:t>
+            </a:r>
+            <a:r>
+              <a:rPr lang="en-GB" sz="1800" dirty="0" smtClean="0"/>
+              <a:t> python 3 a </a:t>
+            </a:r>
+            <a:r>
+              <a:rPr lang="sk-SK" sz="1800" dirty="0" smtClean="0"/>
+              <a:t>pridal som riadok</a:t>
+            </a:r>
+          </a:p>
+          <a:p>
+            <a:pPr marL="0" indent="0">
+              <a:buNone/>
+            </a:pPr>
+            <a:r>
+              <a:rPr lang="sk-SK" sz="1800" dirty="0" smtClean="0">
+                <a:latin typeface="Consolas" panose="020B0609020204030204" pitchFamily="49" charset="0"/>
+              </a:rPr>
+              <a:t>%</a:t>
+            </a:r>
+            <a:r>
+              <a:rPr lang="sk-SK" sz="1800" dirty="0" err="1" smtClean="0">
+                <a:latin typeface="Consolas" panose="020B0609020204030204" pitchFamily="49" charset="0"/>
+              </a:rPr>
+              <a:t>matplotlib</a:t>
+            </a:r>
+            <a:r>
+              <a:rPr lang="sk-SK" sz="1800" dirty="0" smtClean="0">
+                <a:latin typeface="Consolas" panose="020B0609020204030204" pitchFamily="49" charset="0"/>
+              </a:rPr>
+              <a:t> </a:t>
+            </a:r>
+            <a:r>
+              <a:rPr lang="sk-SK" sz="1800" dirty="0" err="1" smtClean="0">
+                <a:latin typeface="Consolas" panose="020B0609020204030204" pitchFamily="49" charset="0"/>
+              </a:rPr>
+              <a:t>inline</a:t>
+            </a:r>
+            <a:endParaRPr lang="sk-SK" sz="1800" dirty="0">
+              <a:latin typeface="Consolas" panose="020B0609020204030204" pitchFamily="49" charset="0"/>
+            </a:endParaRPr>
+          </a:p>
+          <a:p>
+            <a:pPr marL="0" indent="0">
+              <a:buNone/>
+            </a:pPr>
+            <a:r>
+              <a:rPr lang="sk-SK" sz="1800" dirty="0" smtClean="0"/>
+              <a:t>za načítanie knižníc</a:t>
+            </a:r>
+            <a:endParaRPr lang="en-US" sz="1800" dirty="0"/>
           </a:p>
         </p:txBody>
       </p:sp>
     </p:spTree>
     <p:extLst>
       <p:ext uri="{BB962C8B-B14F-4D97-AF65-F5344CB8AC3E}">
-        <p14:creationId xmlns:p14="http://schemas.microsoft.com/office/powerpoint/2010/main" val="413450439"/>
+        <p14:creationId xmlns:p14="http://schemas.microsoft.com/office/powerpoint/2010/main" val="3134723897"/>
       </p:ext>
     </p:extLst>
   </p:cSld>
   <p:clrMapOvr>
     <a:masterClrMapping/>
   </p:clrMapOvr>
+  <p:timing>
+    <p:tnLst>
+      <p:par>
+        <p:cTn id="1" dur="indefinite" restart="never" nodeType="tmRoot"/>
+      </p:par>
+    </p:tnLst>
+  </p:timing>
 </p:sld>
 </file>
 
@@ -3511,10 +3622,6 @@
           <a:bodyPr/>
           <a:lstStyle/>
           <a:p>
-            <a:r>
-              <a:rPr lang="sk-SK" dirty="0" smtClean="0"/>
-              <a:t>Chceme aby ste takéto správy robili aj vy</a:t>
-            </a:r>
             <a:endParaRPr lang="en-US" dirty="0"/>
           </a:p>
         </p:txBody>
@@ -3531,135 +3638,79 @@
         </p:nvSpPr>
         <p:spPr/>
         <p:txBody>
-          <a:bodyPr>
-            <a:normAutofit fontScale="55000" lnSpcReduction="20000"/>
-          </a:bodyPr>
-          <a:lstStyle/>
-          <a:p>
-            <a:r>
-              <a:rPr lang="sk-SK" dirty="0" smtClean="0"/>
-              <a:t>Priamočiaro vykonateľné / reprodukovateľné / </a:t>
-            </a:r>
-            <a:r>
-              <a:rPr lang="sk-SK" dirty="0" err="1" smtClean="0"/>
-              <a:t>znovupoužiteľné</a:t>
-            </a:r>
-            <a:r>
-              <a:rPr lang="sk-SK" dirty="0" smtClean="0"/>
-              <a:t> </a:t>
-            </a:r>
-          </a:p>
-          <a:p>
-            <a:r>
-              <a:rPr lang="sk-SK" dirty="0" smtClean="0"/>
-              <a:t>Úplné </a:t>
-            </a:r>
+          <a:bodyPr/>
+          <a:lstStyle/>
+          <a:p>
+            <a:pPr marL="0" indent="0">
+              <a:buNone/>
+            </a:pPr>
+            <a:r>
+              <a:rPr lang="sk-SK" dirty="0" smtClean="0"/>
+              <a:t>V tomto dokumente je celá analýza, ktorú si vie ktokoľvek prečítať a znovu spustiť</a:t>
+            </a:r>
+          </a:p>
+          <a:p>
+            <a:pPr marL="0" indent="0">
+              <a:buNone/>
+            </a:pPr>
+            <a:r>
+              <a:rPr lang="sk-SK" dirty="0" smtClean="0"/>
+              <a:t>Vidí</a:t>
+            </a:r>
+            <a:r>
+              <a:rPr lang="sk-SK" dirty="0"/>
+              <a:t>:</a:t>
+            </a:r>
+            <a:endParaRPr lang="sk-SK" dirty="0" smtClean="0"/>
           </a:p>
           <a:p>
             <a:pPr lvl="1"/>
             <a:r>
               <a:rPr lang="sk-SK" dirty="0" smtClean="0"/>
-              <a:t>Je tam celé spracovanie. </a:t>
+              <a:t>Výsledky</a:t>
             </a:r>
           </a:p>
           <a:p>
             <a:pPr lvl="1"/>
             <a:r>
               <a:rPr lang="sk-SK" dirty="0" smtClean="0"/>
-              <a:t>Nikde v procese spracovania sa nestalo, že by som ručne v dátach niečo zmenil</a:t>
+              <a:t>Postup</a:t>
             </a:r>
           </a:p>
           <a:p>
             <a:pPr lvl="1"/>
             <a:r>
               <a:rPr lang="sk-SK" dirty="0" smtClean="0"/>
-              <a:t>Ak použijete nejaký iný nástroj na čiastkové spracovanie, tak treba pridať skript alebo presný opis transformácií, ktoré ste ním spravili</a:t>
+              <a:t>Komentáre a interpretáciu</a:t>
             </a:r>
           </a:p>
           <a:p>
             <a:pPr lvl="1"/>
             <a:r>
               <a:rPr lang="sk-SK" dirty="0" smtClean="0"/>
-              <a:t>Všetky použité funkcie sú voľne dostupné alebo priamo pripojené</a:t>
-            </a:r>
-            <a:endParaRPr lang="sk-SK" dirty="0" smtClean="0"/>
-          </a:p>
-          <a:p>
-            <a:r>
-              <a:rPr lang="sk-SK" dirty="0" err="1" smtClean="0"/>
-              <a:t>Kementovaný</a:t>
-            </a:r>
-            <a:r>
-              <a:rPr lang="sk-SK" dirty="0" smtClean="0"/>
-              <a:t> postup a interpretované výsledky</a:t>
-            </a:r>
-          </a:p>
-          <a:p>
-            <a:pPr lvl="1"/>
-            <a:r>
-              <a:rPr lang="sk-SK" dirty="0" smtClean="0">
-                <a:solidFill>
-                  <a:srgbClr val="FF0000"/>
-                </a:solidFill>
-              </a:rPr>
-              <a:t>Len kód nestačí</a:t>
-            </a:r>
-          </a:p>
-          <a:p>
-            <a:r>
-              <a:rPr lang="sk-SK" dirty="0" smtClean="0"/>
-              <a:t>Výsledky priamo v dokumente </a:t>
-            </a:r>
-          </a:p>
-          <a:p>
-            <a:pPr lvl="1"/>
-            <a:r>
-              <a:rPr lang="sk-SK" dirty="0"/>
-              <a:t>A</a:t>
-            </a:r>
-            <a:r>
-              <a:rPr lang="sk-SK" dirty="0" smtClean="0"/>
-              <a:t>k nechcem, tak to nemusím spúšťať na to aby som videl výsledok</a:t>
-            </a:r>
-          </a:p>
-          <a:p>
-            <a:r>
-              <a:rPr lang="sk-SK" dirty="0" smtClean="0"/>
-              <a:t>Nie nutne všetko v jednom súbore. </a:t>
-            </a:r>
-          </a:p>
-          <a:p>
-            <a:pPr lvl="1"/>
-            <a:r>
-              <a:rPr lang="sk-SK" dirty="0" smtClean="0"/>
-              <a:t>Definície funkcií sa dajú importovať pomocou štandardných prostriedok jazyka</a:t>
-            </a:r>
-          </a:p>
-          <a:p>
-            <a:pPr lvl="1"/>
-            <a:r>
-              <a:rPr lang="sk-SK" dirty="0" smtClean="0"/>
-              <a:t>Ucelené časti analýzy sa dajú rozdeliť do viacero notebookov a prepojiť sa pomocou exportovania / importovania dát.</a:t>
-            </a:r>
-          </a:p>
-          <a:p>
-            <a:r>
-              <a:rPr lang="sk-SK" dirty="0" smtClean="0"/>
-              <a:t>Dáta voľne dostupné a pripojené ku kódu alebo aspoň uvedené kde a ako sa dajú získať</a:t>
-            </a:r>
+              <a:t>Prácu s dátami</a:t>
+            </a:r>
+            <a:endParaRPr lang="en-US" dirty="0"/>
           </a:p>
         </p:txBody>
       </p:sp>
     </p:spTree>
     <p:extLst>
       <p:ext uri="{BB962C8B-B14F-4D97-AF65-F5344CB8AC3E}">
-        <p14:creationId xmlns:p14="http://schemas.microsoft.com/office/powerpoint/2010/main" val="2419316939"/>
+        <p14:creationId xmlns:p14="http://schemas.microsoft.com/office/powerpoint/2010/main" val="413450439"/>
       </p:ext>
     </p:extLst>
   </p:cSld>
   <p:clrMapOvr>
     <a:masterClrMapping/>
   </p:clrMapOvr>
+  <p:timing>
+    <p:tnLst>
+      <p:par>
+        <p:cTn id="1" dur="indefinite" restart="never" nodeType="tmRoot"/>
+      </p:par>
+    </p:tnLst>
+  </p:timing>
 </p:sld>
 </file>
 
@@ -3697,7 +3748,7 @@
           <a:p>
             <a:r>
               <a:rPr lang="sk-SK" dirty="0" smtClean="0"/>
-              <a:t>Príklady ďalších notebookov</a:t>
+              <a:t>Chceme aby ste takéto správy robili aj vy</a:t>
             </a:r>
             <a:endParaRPr lang="en-US" dirty="0"/>
           </a:p>
@@ -3715,44 +3766,141 @@
         </p:nvSpPr>
         <p:spPr/>
         <p:txBody>
-          <a:bodyPr/>
-          <a:lstStyle/>
-          <a:p>
-            <a:pPr marL="0" indent="0">
-              <a:buNone/>
-            </a:pPr>
-            <a:r>
-              <a:rPr lang="sk-SK" dirty="0">
-                <a:hlinkClick r:id="rId2"/>
+          <a:bodyPr>
+            <a:normAutofit fontScale="55000" lnSpcReduction="20000"/>
+          </a:bodyPr>
+          <a:lstStyle/>
+          <a:p>
+            <a:r>
+              <a:rPr lang="sk-SK" dirty="0" smtClean="0"/>
+              <a:t>Priamočiaro vykonateľné / reprodukovateľné / </a:t>
+            </a:r>
+            <a:r>
+              <a:rPr lang="sk-SK" dirty="0" err="1" smtClean="0"/>
+              <a:t>znovupoužiteľné</a:t>
+            </a:r>
+            <a:r>
+              <a:rPr lang="sk-SK" dirty="0" smtClean="0"/>
+              <a:t> </a:t>
+            </a:r>
+          </a:p>
+          <a:p>
+            <a:r>
+              <a:rPr lang="sk-SK" dirty="0" smtClean="0"/>
+              <a:t>Úplné </a:t>
+            </a:r>
+          </a:p>
+          <a:p>
+            <a:pPr lvl="1"/>
+            <a:r>
+              <a:rPr lang="sk-SK" dirty="0" smtClean="0"/>
+              <a:t>Je tam celé spracovanie. </a:t>
+            </a:r>
+          </a:p>
+          <a:p>
+            <a:pPr lvl="1"/>
+            <a:r>
+              <a:rPr lang="sk-SK" dirty="0" smtClean="0"/>
+              <a:t>Nikde v procese spracovania sa nestalo, že by som ručne v dátach niečo zmenil</a:t>
+            </a:r>
+          </a:p>
+          <a:p>
+            <a:pPr lvl="1"/>
+            <a:r>
+              <a:rPr lang="sk-SK" dirty="0" smtClean="0"/>
+              <a:t>Ak použijete nejaký iný nástroj na čiastkové spracovanie, tak treba pridať skript alebo presný opis transformácií, ktoré ste ním spravili</a:t>
+            </a:r>
+          </a:p>
+          <a:p>
+            <a:pPr lvl="1"/>
+            <a:r>
+              <a:rPr lang="sk-SK" dirty="0" smtClean="0"/>
+              <a:t>Všetky použité funkcie sú voľne dostupné alebo priamo pripojené</a:t>
+            </a:r>
+          </a:p>
+          <a:p>
+            <a:r>
+              <a:rPr lang="sk-SK" dirty="0" err="1" smtClean="0"/>
+              <a:t>Kementovaný</a:t>
+            </a:r>
+            <a:r>
+              <a:rPr lang="sk-SK" dirty="0" smtClean="0"/>
+              <a:t> postup a interpretované výsledky</a:t>
+            </a:r>
+          </a:p>
+          <a:p>
+            <a:pPr lvl="1"/>
+            <a:r>
+              <a:rPr lang="sk-SK" dirty="0" smtClean="0">
+                <a:solidFill>
+                  <a:srgbClr val="FF0000"/>
+                </a:solidFill>
               </a:rPr>
-              <a:t>https://</a:t>
-            </a:r>
-            <a:r>
-              <a:rPr lang="sk-SK" dirty="0" smtClean="0">
-                <a:hlinkClick r:id="rId2"/>
-              </a:rPr>
-              <a:t>github.com/jupyter/jupyter/wiki/A-gallery-of-interesting-Jupyter-Notebooks</a:t>
-            </a:r>
-            <a:endParaRPr lang="sk-SK" dirty="0" smtClean="0"/>
-          </a:p>
-          <a:p>
-            <a:pPr marL="0" indent="0">
-              <a:buNone/>
-            </a:pPr>
-            <a:endParaRPr lang="en-US" dirty="0"/>
+              <a:t>Len kód nestačí</a:t>
+            </a:r>
+          </a:p>
+          <a:p>
+            <a:r>
+              <a:rPr lang="sk-SK" dirty="0" smtClean="0"/>
+              <a:t>Výsledky priamo v dokumente </a:t>
+            </a:r>
+          </a:p>
+          <a:p>
+            <a:pPr lvl="1"/>
+            <a:r>
+              <a:rPr lang="sk-SK" dirty="0"/>
+              <a:t>A</a:t>
+            </a:r>
+            <a:r>
+              <a:rPr lang="sk-SK" dirty="0" smtClean="0"/>
+              <a:t>k nechcem, tak to nemusím spúšťať na to aby som videl výsledok</a:t>
+            </a:r>
+          </a:p>
+          <a:p>
+            <a:r>
+              <a:rPr lang="sk-SK" dirty="0" smtClean="0"/>
+              <a:t>Nie nutne všetko v jednom súbore. </a:t>
+            </a:r>
+          </a:p>
+          <a:p>
+            <a:pPr lvl="1"/>
+            <a:r>
+              <a:rPr lang="sk-SK" dirty="0" smtClean="0"/>
+              <a:t>Definície funkcií sa dajú importovať pomocou štandardných prostriedok jazyka</a:t>
+            </a:r>
+          </a:p>
+          <a:p>
+            <a:pPr lvl="1"/>
+            <a:r>
+              <a:rPr lang="sk-SK" dirty="0" smtClean="0"/>
+              <a:t>Ucelené časti analýzy sa dajú rozdeliť do viacero notebookov a prepojiť sa pomocou exportovania / importovania dát.</a:t>
+            </a:r>
+          </a:p>
+          <a:p>
+            <a:r>
+              <a:rPr lang="sk-SK" dirty="0" smtClean="0"/>
+              <a:t>Dáta voľne dostupné a pripojené ku kódu alebo aspoň uvedené kde a ako sa dajú získať</a:t>
+            </a:r>
           </a:p>
         </p:txBody>
       </p:sp>
     </p:spTree>
     <p:extLst>
       <p:ext uri="{BB962C8B-B14F-4D97-AF65-F5344CB8AC3E}">
-        <p14:creationId xmlns:p14="http://schemas.microsoft.com/office/powerpoint/2010/main" val="1407230511"/>
+        <p14:creationId xmlns:p14="http://schemas.microsoft.com/office/powerpoint/2010/main" val="2419316939"/>
       </p:ext>
     </p:extLst>
   </p:cSld>
   <p:clrMapOvr>
     <a:masterClrMapping/>
   </p:clrMapOvr>
+  <p:timing>
+    <p:tnLst>
+      <p:par>
+        <p:cTn id="1" dur="indefinite" restart="never" nodeType="tmRoot"/>
+      </p:par>
+    </p:tnLst>
+  </p:timing>
 </p:sld>
 </file>
 
@@ -3775,6 +3923,106 @@
       </p:grpSpPr>
       <p:sp>
         <p:nvSpPr>
+          <p:cNvPr id="2" name="Title 1"/>
+          <p:cNvSpPr>
+            <a:spLocks noGrp="1"/>
+          </p:cNvSpPr>
+          <p:nvPr>
+            <p:ph type="title"/>
+          </p:nvPr>
+        </p:nvSpPr>
+        <p:spPr/>
+        <p:txBody>
+          <a:bodyPr/>
+          <a:lstStyle/>
+          <a:p>
+            <a:r>
+              <a:rPr lang="sk-SK" dirty="0" smtClean="0"/>
+              <a:t>Príklady ďalších notebookov</a:t>
+            </a:r>
+            <a:endParaRPr lang="en-US" dirty="0"/>
+          </a:p>
+        </p:txBody>
+      </p:sp>
+      <p:sp>
+        <p:nvSpPr>
+          <p:cNvPr id="3" name="Content Placeholder 2"/>
+          <p:cNvSpPr>
+            <a:spLocks noGrp="1"/>
+          </p:cNvSpPr>
+          <p:nvPr>
+            <p:ph idx="1"/>
+          </p:nvPr>
+        </p:nvSpPr>
+        <p:spPr/>
+        <p:txBody>
+          <a:bodyPr/>
+          <a:lstStyle/>
+          <a:p>
+            <a:pPr marL="0" indent="0">
+              <a:buNone/>
+            </a:pPr>
+            <a:r>
+              <a:rPr lang="sk-SK" dirty="0">
+                <a:hlinkClick r:id="rId2"/>
+              </a:rPr>
+              <a:t>https://</a:t>
+            </a:r>
+            <a:r>
+              <a:rPr lang="sk-SK" dirty="0" smtClean="0">
+                <a:hlinkClick r:id="rId2"/>
+              </a:rPr>
+              <a:t>github.com/jupyter/jupyter/wiki/A-gallery-of-interesting-Jupyter-Notebooks</a:t>
+            </a:r>
+            <a:endParaRPr lang="sk-SK" dirty="0" smtClean="0"/>
+          </a:p>
+          <a:p>
+            <a:pPr marL="0" indent="0">
+              <a:buNone/>
+            </a:pPr>
+            <a:endParaRPr lang="en-US" dirty="0"/>
+          </a:p>
+        </p:txBody>
+      </p:sp>
+    </p:spTree>
+    <p:extLst>
+      <p:ext uri="{BB962C8B-B14F-4D97-AF65-F5344CB8AC3E}">
+        <p14:creationId xmlns:p14="http://schemas.microsoft.com/office/powerpoint/2010/main" val="1407230511"/>
+      </p:ext>
+    </p:extLst>
+  </p:cSld>
+  <p:clrMapOvr>
+    <a:masterClrMapping/>
+  </p:clrMapOvr>
+  <p:timing>
+    <p:tnLst>
+      <p:par>
+        <p:cTn id="1" dur="indefinite" restart="never" nodeType="tmRoot"/>
+      </p:par>
+    </p:tnLst>
+  </p:timing>
+</p:sld>
+</file>
+
+<file path=ppt/slides/slide14.xml><?xml version="1.0" encoding="utf-8"?>
+<p:sld xmlns:a="http://schemas.openxmlformats.org/drawingml/2006/main" xmlns:r="http://schemas.openxmlformats.org/officeDocument/2006/relationships" xmlns:p="http://schemas.openxmlformats.org/presentationml/2006/main">
+  <p:cSld>
+    <p:spTree>
+      <p:nvGrpSpPr>
+        <p:cNvPr id="1" name=""/>
+        <p:cNvGrpSpPr/>
+        <p:nvPr/>
+      </p:nvGrpSpPr>
+      <p:grpSpPr>
+        <a:xfrm>
+          <a:off x="0" y="0"/>
+          <a:ext cx="0" cy="0"/>
+          <a:chOff x="0" y="0"/>
+          <a:chExt cx="0" cy="0"/>
+        </a:xfrm>
+      </p:grpSpPr>
+      <p:sp>
+        <p:nvSpPr>
           <p:cNvPr id="4" name="Title 3"/>
           <p:cNvSpPr>
             <a:spLocks noGrp="1"/>
@@ -3832,6 +4080,13 @@
   <p:clrMapOvr>
     <a:masterClrMapping/>
   </p:clrMapOvr>
+  <p:timing>
+    <p:tnLst>
+      <p:par>
+        <p:cTn id="1" dur="indefinite" restart="never" nodeType="tmRoot"/>
+      </p:par>
+    </p:tnLst>
+  </p:timing>
 </p:sld>
 </file>
 
@@ -3962,6 +4217,13 @@
   <p:clrMapOvr>
     <a:masterClrMapping/>
   </p:clrMapOvr>
+  <p:timing>
+    <p:tnLst>
+      <p:par>
+        <p:cTn id="1" dur="indefinite" restart="never" nodeType="tmRoot"/>
+      </p:par>
+    </p:tnLst>
+  </p:timing>
 </p:sld>
 </file>
 
@@ -3998,18 +4260,24 @@
           <a:lstStyle/>
           <a:p>
             <a:r>
-              <a:rPr lang="sk-SK" dirty="0" smtClean="0">
-                <a:solidFill>
-                  <a:schemeClr val="bg2">
-                    <a:lumMod val="75000"/>
-                  </a:schemeClr>
-                </a:solidFill>
-              </a:rPr>
-              <a:t>Ťažko</a:t>
-            </a:r>
-            <a:r>
-              <a:rPr lang="sk-SK" dirty="0" smtClean="0"/>
-              <a:t> Reprodukovateľný výskum</a:t>
+              <a:rPr lang="en-US" dirty="0" err="1" smtClean="0"/>
+              <a:t>Ot</a:t>
+            </a:r>
+            <a:r>
+              <a:rPr lang="sk-SK" dirty="0" smtClean="0"/>
+              <a:t>á</a:t>
+            </a:r>
+            <a:r>
+              <a:rPr lang="en-US" dirty="0" err="1" smtClean="0"/>
+              <a:t>zky</a:t>
+            </a:r>
+            <a:r>
+              <a:rPr lang="en-US" dirty="0" smtClean="0"/>
+              <a:t> a </a:t>
+            </a:r>
+            <a:r>
+              <a:rPr lang="sk-SK" dirty="0" smtClean="0"/>
+              <a:t>spätná väzba</a:t>
             </a:r>
             <a:endParaRPr lang="en-US" dirty="0"/>
           </a:p>
@@ -4028,108 +4296,76 @@
         <p:spPr/>
         <p:txBody>
           <a:bodyPr>
-            <a:normAutofit fontScale="92500" lnSpcReduction="10000"/>
+            <a:normAutofit/>
           </a:bodyPr>
           <a:lstStyle/>
           <a:p>
-            <a:pPr marL="514350" indent="-514350">
-              <a:buFont typeface="+mj-lt"/>
-              <a:buAutoNum type="arabicPeriod"/>
+            <a:pPr marL="0" indent="0" algn="ctr">
+              <a:buNone/>
             </a:pPr>
-            <a:r>
-              <a:rPr lang="sk-SK" dirty="0" smtClean="0"/>
-              <a:t>Nazbieraj dáta a ulož ako CSV</a:t>
-            </a:r>
-          </a:p>
-          <a:p>
-            <a:pPr marL="514350" indent="-514350">
-              <a:buFont typeface="+mj-lt"/>
-              <a:buAutoNum type="arabicPeriod"/>
+            <a:endParaRPr lang="sk-SK" sz="4400" dirty="0" smtClean="0"/>
+          </a:p>
+          <a:p>
+            <a:pPr marL="0" indent="0" algn="ctr">
+              <a:buNone/>
             </a:pPr>
             <a:r>
-              <a:rPr lang="sk-SK" dirty="0" smtClean="0"/>
-              <a:t>Pozri sa do dát pomocou obľúbeného nástroja (napr. Excel, SQL)</a:t>
-            </a:r>
-          </a:p>
-          <a:p>
-            <a:pPr lvl="1"/>
-            <a:r>
-              <a:rPr lang="sk-SK" dirty="0" smtClean="0"/>
-              <a:t>Surové dáta</a:t>
-            </a:r>
-          </a:p>
-          <a:p>
-            <a:pPr lvl="1"/>
-            <a:r>
-              <a:rPr lang="sk-SK" dirty="0" smtClean="0"/>
-              <a:t>Základné grafy</a:t>
-            </a:r>
-          </a:p>
-          <a:p>
-            <a:pPr lvl="1"/>
-            <a:r>
-              <a:rPr lang="sk-SK" dirty="0" smtClean="0"/>
-              <a:t>Pivot table</a:t>
-            </a:r>
-          </a:p>
-          <a:p>
-            <a:pPr marL="514350" indent="-514350">
-              <a:buFont typeface="+mj-lt"/>
-              <a:buAutoNum type="arabicPeriod"/>
+              <a:rPr lang="sk-SK" sz="4400" dirty="0" smtClean="0"/>
+              <a:t>s</a:t>
+            </a:r>
+            <a:r>
+              <a:rPr lang="en-US" sz="4400" dirty="0" smtClean="0"/>
+              <a:t>lido</a:t>
+            </a:r>
+            <a:r>
+              <a:rPr lang="sk-SK" sz="4400" dirty="0" smtClean="0"/>
+              <a:t>.</a:t>
+            </a:r>
+            <a:r>
+              <a:rPr lang="en-US" sz="4400" dirty="0" smtClean="0"/>
+              <a:t>com#</a:t>
+            </a:r>
+            <a:r>
+              <a:rPr lang="en-US" sz="4400" b="1" dirty="0" smtClean="0"/>
+              <a:t>iau2018-w02</a:t>
+            </a:r>
+            <a:endParaRPr lang="en-US" sz="4400" b="1" dirty="0"/>
+          </a:p>
+          <a:p>
+            <a:pPr marL="0" indent="0" algn="ctr">
+              <a:buNone/>
             </a:pPr>
-            <a:r>
-              <a:rPr lang="sk-SK" dirty="0" smtClean="0"/>
-              <a:t>Manuálne uprav dáta (doplň chýbajúce dáta, odstráň nezmysli, oprav formát ...). </a:t>
-            </a:r>
-          </a:p>
-          <a:p>
-            <a:pPr lvl="1"/>
-            <a:r>
-              <a:rPr lang="sk-SK" dirty="0" smtClean="0"/>
-              <a:t>Ak si do CV píšete expert na </a:t>
-            </a:r>
-            <a:r>
-              <a:rPr lang="sk-SK" dirty="0"/>
-              <a:t>E</a:t>
-            </a:r>
-            <a:r>
-              <a:rPr lang="sk-SK" dirty="0" smtClean="0"/>
-              <a:t>xcel, tak si možno aj makro napíšete</a:t>
-            </a:r>
-          </a:p>
-          <a:p>
-            <a:pPr marL="514350" indent="-514350">
-              <a:buFont typeface="+mj-lt"/>
-              <a:buAutoNum type="arabicPeriod"/>
+            <a:endParaRPr lang="sk-SK" sz="4400" dirty="0" smtClean="0"/>
+          </a:p>
+          <a:p>
+            <a:pPr marL="0" indent="0" algn="ctr">
+              <a:buNone/>
             </a:pPr>
             <a:r>
-              <a:rPr lang="sk-SK" dirty="0" smtClean="0"/>
-              <a:t>Ak treba, opakuj od kroku 2</a:t>
-            </a:r>
-          </a:p>
-          <a:p>
-            <a:pPr marL="514350" indent="-514350">
-              <a:buFont typeface="+mj-lt"/>
-              <a:buAutoNum type="arabicPeriod"/>
-            </a:pPr>
-            <a:r>
-              <a:rPr lang="sk-SK" dirty="0" smtClean="0"/>
-              <a:t>Sprav úlohu, ktorú od teba chceli od začiatku a odovzdaj výsledok</a:t>
-            </a:r>
-            <a:endParaRPr lang="en-US" dirty="0"/>
+              <a:rPr lang="en-US" sz="4400" dirty="0" smtClean="0"/>
+              <a:t>tinyurl.com/iau2018-19</a:t>
+            </a:r>
+            <a:endParaRPr lang="en-US" sz="4400" dirty="0"/>
           </a:p>
         </p:txBody>
       </p:sp>
     </p:spTree>
     <p:extLst>
       <p:ext uri="{BB962C8B-B14F-4D97-AF65-F5344CB8AC3E}">
-        <p14:creationId xmlns:p14="http://schemas.microsoft.com/office/powerpoint/2010/main" val="349663154"/>
+        <p14:creationId xmlns:p14="http://schemas.microsoft.com/office/powerpoint/2010/main" val="1364421455"/>
       </p:ext>
     </p:extLst>
   </p:cSld>
   <p:clrMapOvr>
     <a:masterClrMapping/>
   </p:clrMapOvr>
+  <p:timing>
+    <p:tnLst>
+      <p:par>
+        <p:cTn id="1" dur="indefinite" restart="never" nodeType="tmRoot"/>
+      </p:par>
+    </p:tnLst>
+  </p:timing>
 </p:sld>
 </file>
 
@@ -4162,14 +4398,22 @@
         </p:nvSpPr>
         <p:spPr/>
         <p:txBody>
-          <a:bodyPr>
-            <a:normAutofit fontScale="90000"/>
-          </a:bodyPr>
-          <a:lstStyle/>
-          <a:p>
-            <a:r>
-              <a:rPr lang="sk-SK" dirty="0" smtClean="0"/>
-              <a:t>Čo sa stane ak dostanem iné dáta a mám zopakovať analýzu? Alebo nebodaj pridať malú zmenu?</a:t>
+          <a:bodyPr/>
+          <a:lstStyle/>
+          <a:p>
+            <a:r>
+              <a:rPr lang="sk-SK" dirty="0" smtClean="0">
+                <a:solidFill>
+                  <a:schemeClr val="bg2">
+                    <a:lumMod val="75000"/>
+                  </a:schemeClr>
+                </a:solidFill>
+              </a:rPr>
+              <a:t>Ťažko</a:t>
+            </a:r>
+            <a:r>
+              <a:rPr lang="sk-SK" dirty="0" smtClean="0"/>
+              <a:t> Reprodukovateľný výskum</a:t>
             </a:r>
             <a:endParaRPr lang="en-US" dirty="0"/>
           </a:p>
@@ -4197,13 +4441,7 @@
               <a:buAutoNum type="arabicPeriod"/>
             </a:pPr>
             <a:r>
-              <a:rPr lang="sk-SK" dirty="0" smtClean="0">
-                <a:solidFill>
-                  <a:schemeClr val="bg2">
-                    <a:lumMod val="50000"/>
-                  </a:schemeClr>
-                </a:solidFill>
-              </a:rPr>
+              <a:rPr lang="sk-SK" dirty="0" smtClean="0"/>
               <a:t>Nazbieraj dáta a ulož ako CSV</a:t>
             </a:r>
           </a:p>
@@ -4213,52 +4451,28 @@
               <a:buAutoNum type="arabicPeriod"/>
             </a:pPr>
             <a:r>
-              <a:rPr lang="sk-SK" dirty="0" smtClean="0">
-                <a:solidFill>
-                  <a:schemeClr val="bg2">
-                    <a:lumMod val="50000"/>
-                  </a:schemeClr>
-                </a:solidFill>
-              </a:rPr>
+              <a:rPr lang="sk-SK" dirty="0" smtClean="0"/>
               <a:t>Pozri sa do dát pomocou obľúbeného nástroja (napr. Excel, SQL)</a:t>
             </a:r>
           </a:p>
           <a:p>
             <a:pPr lvl="1"/>
             <a:r>
-              <a:rPr lang="sk-SK" dirty="0" smtClean="0">
-                <a:solidFill>
-                  <a:schemeClr val="bg2">
-                    <a:lumMod val="50000"/>
-                  </a:schemeClr>
-                </a:solidFill>
-              </a:rPr>
+              <a:rPr lang="sk-SK" dirty="0" smtClean="0"/>
               <a:t>Surové dáta</a:t>
             </a:r>
           </a:p>
           <a:p>
             <a:pPr lvl="1"/>
             <a:r>
-              <a:rPr lang="sk-SK" dirty="0" smtClean="0">
-                <a:solidFill>
-                  <a:schemeClr val="bg2">
-                    <a:lumMod val="50000"/>
-                  </a:schemeClr>
-                </a:solidFill>
-              </a:rPr>
+              <a:rPr lang="sk-SK" dirty="0" smtClean="0"/>
               <a:t>Základné grafy</a:t>
             </a:r>
           </a:p>
           <a:p>
             <a:pPr lvl="1"/>
             <a:r>
-              <a:rPr lang="sk-SK" dirty="0" smtClean="0">
-                <a:solidFill>
-                  <a:schemeClr val="bg2">
-                    <a:lumMod val="50000"/>
-                  </a:schemeClr>
-                </a:solidFill>
-              </a:rPr>
+              <a:rPr lang="sk-SK" dirty="0" smtClean="0"/>
               <a:t>Pivot table</a:t>
             </a:r>
           </a:p>
@@ -4269,30 +4483,22 @@
             </a:pPr>
             <a:r>
               <a:rPr lang="sk-SK" dirty="0" smtClean="0"/>
-              <a:t>Manuálne</a:t>
-            </a:r>
-            <a:r>
-              <a:rPr lang="sk-SK" dirty="0" smtClean="0">
-                <a:solidFill>
-                  <a:schemeClr val="bg2">
-                    <a:lumMod val="50000"/>
-                  </a:schemeClr>
-                </a:solidFill>
-              </a:rPr>
-              <a:t> uprav dáta (doplň chýbajúce dáta, odstráň nezmysli, oprav formát ...). </a:t>
+              <a:t>Manuálne uprav dáta (doplň chýbajúce dáta, odstráň nezmysli, oprav formát ...). </a:t>
             </a:r>
           </a:p>
           <a:p>
             <a:pPr lvl="1"/>
             <a:r>
-              <a:rPr lang="sk-SK" dirty="0" smtClean="0">
-                <a:solidFill>
-                  <a:schemeClr val="bg2">
-                    <a:lumMod val="50000"/>
-                  </a:schemeClr>
-                </a:solidFill>
-              </a:rPr>
-              <a:t>Ak si do CV píšete expert na Excel, tak si možno aj makro napíšete</a:t>
+              <a:rPr lang="sk-SK" dirty="0" smtClean="0"/>
+              <a:t>Ak si do CV píšete expert na </a:t>
+            </a:r>
+            <a:r>
+              <a:rPr lang="sk-SK" dirty="0"/>
+              <a:t>E</a:t>
+            </a:r>
+            <a:r>
+              <a:rPr lang="sk-SK" dirty="0" smtClean="0"/>
+              <a:t>xcel, tak si možno aj makro napíšete</a:t>
             </a:r>
           </a:p>
           <a:p>
@@ -4301,28 +4507,8 @@
               <a:buAutoNum type="arabicPeriod"/>
             </a:pPr>
             <a:r>
-              <a:rPr lang="sk-SK" dirty="0" smtClean="0">
-                <a:solidFill>
-                  <a:schemeClr val="bg2">
-                    <a:lumMod val="50000"/>
-                  </a:schemeClr>
-                </a:solidFill>
-              </a:rPr>
-              <a:t>Ak treba, </a:t>
-            </a:r>
-            <a:r>
-              <a:rPr lang="sk-SK" dirty="0" smtClean="0"/>
-              <a:t>opakuj</a:t>
-            </a:r>
-            <a:r>
-              <a:rPr lang="sk-SK" dirty="0" smtClean="0">
-                <a:solidFill>
-                  <a:schemeClr val="bg2">
-                    <a:lumMod val="50000"/>
-                  </a:schemeClr>
-                </a:solidFill>
-              </a:rPr>
-              <a:t> od kroku 2</a:t>
+              <a:rPr lang="sk-SK" dirty="0" smtClean="0"/>
+              <a:t>Ak treba, opakuj od kroku 2</a:t>
             </a:r>
           </a:p>
           <a:p>
@@ -4331,35 +4517,30 @@
               <a:buAutoNum type="arabicPeriod"/>
             </a:pPr>
             <a:r>
-              <a:rPr lang="sk-SK" dirty="0" smtClean="0">
-                <a:solidFill>
-                  <a:schemeClr val="bg2">
-                    <a:lumMod val="50000"/>
-                  </a:schemeClr>
-                </a:solidFill>
-              </a:rPr>
+              <a:rPr lang="sk-SK" dirty="0" smtClean="0"/>
               <a:t>Sprav úlohu, ktorú od teba chceli od začiatku a odovzdaj výsledok</a:t>
             </a:r>
-            <a:endParaRPr lang="en-US" dirty="0" smtClean="0">
-              <a:solidFill>
-                <a:schemeClr val="bg2">
-                  <a:lumMod val="50000"/>
-                </a:schemeClr>
-              </a:solidFill>
-            </a:endParaRPr>
+            <a:endParaRPr lang="en-US" dirty="0"/>
           </a:p>
         </p:txBody>
       </p:sp>
     </p:spTree>
     <p:extLst>
       <p:ext uri="{BB962C8B-B14F-4D97-AF65-F5344CB8AC3E}">
-        <p14:creationId xmlns:p14="http://schemas.microsoft.com/office/powerpoint/2010/main" val="3168198130"/>
+        <p14:creationId xmlns:p14="http://schemas.microsoft.com/office/powerpoint/2010/main" val="349663154"/>
       </p:ext>
     </p:extLst>
   </p:cSld>
   <p:clrMapOvr>
     <a:masterClrMapping/>
   </p:clrMapOvr>
+  <p:timing>
+    <p:tnLst>
+      <p:par>
+        <p:cTn id="1" dur="indefinite" restart="never" nodeType="tmRoot"/>
+      </p:par>
+    </p:tnLst>
+  </p:timing>
 </p:sld>
 </file>
 
@@ -4392,44 +4573,14 @@
         </p:nvSpPr>
         <p:spPr/>
         <p:txBody>
-          <a:bodyPr/>
-          <a:lstStyle/>
-          <a:p>
-            <a:r>
-              <a:rPr lang="en-GB" dirty="0" err="1" smtClean="0"/>
-              <a:t>Probl</a:t>
-            </a:r>
-            <a:r>
-              <a:rPr lang="sk-SK" dirty="0" smtClean="0"/>
-              <a:t>é</a:t>
-            </a:r>
-            <a:r>
-              <a:rPr lang="en-GB" dirty="0" smtClean="0"/>
-              <a:t>my </a:t>
-            </a:r>
-            <a:r>
-              <a:rPr lang="en-GB" dirty="0" err="1" smtClean="0"/>
-              <a:t>toh</a:t>
-            </a:r>
-            <a:r>
-              <a:rPr lang="sk-SK" dirty="0" smtClean="0"/>
-              <a:t>o</a:t>
-            </a:r>
-            <a:r>
-              <a:rPr lang="en-GB" dirty="0" smtClean="0"/>
-              <a:t>to </a:t>
-            </a:r>
-            <a:r>
-              <a:rPr lang="en-GB" dirty="0" err="1" smtClean="0"/>
-              <a:t>pr</a:t>
-            </a:r>
-            <a:r>
-              <a:rPr lang="sk-SK" dirty="0" smtClean="0"/>
-              <a:t>í</a:t>
-            </a:r>
-            <a:r>
-              <a:rPr lang="en-GB" dirty="0" err="1" smtClean="0"/>
-              <a:t>stupu</a:t>
+          <a:bodyPr>
+            <a:normAutofit fontScale="90000"/>
+          </a:bodyPr>
+          <a:lstStyle/>
+          <a:p>
+            <a:r>
+              <a:rPr lang="sk-SK" dirty="0" smtClean="0"/>
+              <a:t>Čo sa stane ak dostanem iné dáta a mám zopakovať analýzu? Alebo nebodaj pridať malú zmenu?</a:t>
             </a:r>
             <a:endParaRPr lang="en-US" dirty="0"/>
           </a:p>
@@ -4447,47 +4598,186 @@
         </p:nvSpPr>
         <p:spPr/>
         <p:txBody>
-          <a:bodyPr/>
-          <a:lstStyle/>
-          <a:p>
-            <a:r>
-              <a:rPr lang="sk-SK" dirty="0" smtClean="0"/>
-              <a:t>Celý postup musím opakovať znovu.</a:t>
-            </a:r>
-          </a:p>
-          <a:p>
-            <a:r>
-              <a:rPr lang="sk-SK" dirty="0" smtClean="0"/>
-              <a:t>Veľa manuálnej práce.</a:t>
-            </a:r>
-          </a:p>
-          <a:p>
-            <a:r>
-              <a:rPr lang="sk-SK" dirty="0" smtClean="0"/>
-              <a:t>Mám približnú predstavu ako som postupoval, ale nepamätám si to presne.</a:t>
-            </a:r>
-          </a:p>
-          <a:p>
-            <a:r>
-              <a:rPr lang="sk-SK" dirty="0" smtClean="0"/>
-              <a:t>Ten, komu som ten výsledok odovzdal nevie, čo som spravil s dátami na to aby som ho dosiahol.</a:t>
-            </a:r>
-          </a:p>
-          <a:p>
-            <a:endParaRPr lang="en-US" dirty="0"/>
+          <a:bodyPr>
+            <a:normAutofit fontScale="92500" lnSpcReduction="10000"/>
+          </a:bodyPr>
+          <a:lstStyle/>
+          <a:p>
+            <a:pPr marL="514350" indent="-514350">
+              <a:buFont typeface="+mj-lt"/>
+              <a:buAutoNum type="arabicPeriod"/>
+            </a:pPr>
+            <a:r>
+              <a:rPr lang="sk-SK" dirty="0" smtClean="0">
+                <a:solidFill>
+                  <a:schemeClr val="bg2">
+                    <a:lumMod val="50000"/>
+                  </a:schemeClr>
+                </a:solidFill>
+              </a:rPr>
+              <a:t>Nazbieraj dáta a ulož ako CSV</a:t>
+            </a:r>
+          </a:p>
+          <a:p>
+            <a:pPr marL="514350" indent="-514350">
+              <a:buFont typeface="+mj-lt"/>
+              <a:buAutoNum type="arabicPeriod"/>
+            </a:pPr>
+            <a:r>
+              <a:rPr lang="sk-SK" dirty="0" smtClean="0">
+                <a:solidFill>
+                  <a:schemeClr val="bg2">
+                    <a:lumMod val="50000"/>
+                  </a:schemeClr>
+                </a:solidFill>
+              </a:rPr>
+              <a:t>Pozri sa do dát pomocou obľúbeného nástroja (napr. Excel, SQL)</a:t>
+            </a:r>
+          </a:p>
+          <a:p>
+            <a:pPr lvl="1"/>
+            <a:r>
+              <a:rPr lang="sk-SK" dirty="0" smtClean="0">
+                <a:solidFill>
+                  <a:schemeClr val="bg2">
+                    <a:lumMod val="50000"/>
+                  </a:schemeClr>
+                </a:solidFill>
+              </a:rPr>
+              <a:t>Surové dáta</a:t>
+            </a:r>
+          </a:p>
+          <a:p>
+            <a:pPr lvl="1"/>
+            <a:r>
+              <a:rPr lang="sk-SK" dirty="0" smtClean="0">
+                <a:solidFill>
+                  <a:schemeClr val="bg2">
+                    <a:lumMod val="50000"/>
+                  </a:schemeClr>
+                </a:solidFill>
+              </a:rPr>
+              <a:t>Základné grafy</a:t>
+            </a:r>
+          </a:p>
+          <a:p>
+            <a:pPr lvl="1"/>
+            <a:r>
+              <a:rPr lang="sk-SK" dirty="0" smtClean="0">
+                <a:solidFill>
+                  <a:schemeClr val="bg2">
+                    <a:lumMod val="50000"/>
+                  </a:schemeClr>
+                </a:solidFill>
+              </a:rPr>
+              <a:t>Pivot table</a:t>
+            </a:r>
+          </a:p>
+          <a:p>
+            <a:pPr marL="514350" indent="-514350">
+              <a:buFont typeface="+mj-lt"/>
+              <a:buAutoNum type="arabicPeriod"/>
+            </a:pPr>
+            <a:r>
+              <a:rPr lang="sk-SK" dirty="0" smtClean="0"/>
+              <a:t>Manuálne</a:t>
+            </a:r>
+            <a:r>
+              <a:rPr lang="sk-SK" dirty="0" smtClean="0">
+                <a:solidFill>
+                  <a:schemeClr val="bg2">
+                    <a:lumMod val="50000"/>
+                  </a:schemeClr>
+                </a:solidFill>
+              </a:rPr>
+              <a:t> uprav dáta (doplň chýbajúce dáta, odstráň nezmysli, oprav formát ...). </a:t>
+            </a:r>
+          </a:p>
+          <a:p>
+            <a:pPr lvl="1"/>
+            <a:r>
+              <a:rPr lang="sk-SK" dirty="0" smtClean="0">
+                <a:solidFill>
+                  <a:schemeClr val="bg2">
+                    <a:lumMod val="50000"/>
+                  </a:schemeClr>
+                </a:solidFill>
+              </a:rPr>
+              <a:t>Ak si do CV píšete expert na Excel, tak si možno aj makro napíšete</a:t>
+            </a:r>
+          </a:p>
+          <a:p>
+            <a:pPr marL="514350" indent="-514350">
+              <a:buFont typeface="+mj-lt"/>
+              <a:buAutoNum type="arabicPeriod"/>
+            </a:pPr>
+            <a:r>
+              <a:rPr lang="sk-SK" dirty="0" smtClean="0">
+                <a:solidFill>
+                  <a:schemeClr val="bg2">
+                    <a:lumMod val="50000"/>
+                  </a:schemeClr>
+                </a:solidFill>
+              </a:rPr>
+              <a:t>Ak treba, </a:t>
+            </a:r>
+            <a:r>
+              <a:rPr lang="sk-SK" dirty="0" smtClean="0"/>
+              <a:t>opakuj</a:t>
+            </a:r>
+            <a:r>
+              <a:rPr lang="sk-SK" dirty="0" smtClean="0">
+                <a:solidFill>
+                  <a:schemeClr val="bg2">
+                    <a:lumMod val="50000"/>
+                  </a:schemeClr>
+                </a:solidFill>
+              </a:rPr>
+              <a:t> od kroku 2</a:t>
+            </a:r>
+          </a:p>
+          <a:p>
+            <a:pPr marL="514350" indent="-514350">
+              <a:buFont typeface="+mj-lt"/>
+              <a:buAutoNum type="arabicPeriod"/>
+            </a:pPr>
+            <a:r>
+              <a:rPr lang="sk-SK" dirty="0" smtClean="0">
+                <a:solidFill>
+                  <a:schemeClr val="bg2">
+                    <a:lumMod val="50000"/>
+                  </a:schemeClr>
+                </a:solidFill>
+              </a:rPr>
+              <a:t>Sprav úlohu, ktorú od teba chceli od začiatku a odovzdaj výsledok</a:t>
+            </a:r>
+            <a:endParaRPr lang="en-US" dirty="0" smtClean="0">
+              <a:solidFill>
+                <a:schemeClr val="bg2">
+                  <a:lumMod val="50000"/>
+                </a:schemeClr>
+              </a:solidFill>
+            </a:endParaRPr>
           </a:p>
         </p:txBody>
       </p:sp>
     </p:spTree>
     <p:extLst>
       <p:ext uri="{BB962C8B-B14F-4D97-AF65-F5344CB8AC3E}">
-        <p14:creationId xmlns:p14="http://schemas.microsoft.com/office/powerpoint/2010/main" val="2667502804"/>
+        <p14:creationId xmlns:p14="http://schemas.microsoft.com/office/powerpoint/2010/main" val="3168198130"/>
       </p:ext>
     </p:extLst>
   </p:cSld>
   <p:clrMapOvr>
     <a:masterClrMapping/>
   </p:clrMapOvr>
+  <p:timing>
+    <p:tnLst>
+      <p:par>
+        <p:cTn id="1" dur="indefinite" restart="never" nodeType="tmRoot"/>
+      </p:par>
+    </p:tnLst>
+  </p:timing>
 </p:sld>
 </file>
 
@@ -4524,12 +4814,40 @@
           <a:lstStyle/>
           <a:p>
             <a:r>
-              <a:rPr lang="sk-SK" dirty="0"/>
-              <a:t>Č</a:t>
-            </a:r>
-            <a:r>
-              <a:rPr lang="sk-SK" dirty="0" smtClean="0"/>
-              <a:t>o by sme potrebovali</a:t>
+              <a:rPr lang="en-GB" dirty="0" err="1" smtClean="0"/>
+              <a:t>Probl</a:t>
+            </a:r>
+            <a:r>
+              <a:rPr lang="sk-SK" dirty="0" smtClean="0"/>
+              <a:t>é</a:t>
+            </a:r>
+            <a:r>
+              <a:rPr lang="en-GB" dirty="0" smtClean="0"/>
+              <a:t>my </a:t>
+            </a:r>
+            <a:r>
+              <a:rPr lang="en-GB" dirty="0" err="1" smtClean="0"/>
+              <a:t>toh</a:t>
+            </a:r>
+            <a:r>
+              <a:rPr lang="sk-SK" dirty="0" smtClean="0"/>
+              <a:t>o</a:t>
+            </a:r>
+            <a:r>
+              <a:rPr lang="en-GB" dirty="0" smtClean="0"/>
+              <a:t>to </a:t>
+            </a:r>
+            <a:r>
+              <a:rPr lang="en-GB" dirty="0" err="1" smtClean="0"/>
+              <a:t>pr</a:t>
+            </a:r>
+            <a:r>
+              <a:rPr lang="sk-SK" dirty="0" smtClean="0"/>
+              <a:t>í</a:t>
+            </a:r>
+            <a:r>
+              <a:rPr lang="en-GB" dirty="0" err="1" smtClean="0"/>
+              <a:t>stupu</a:t>
             </a:r>
             <a:endParaRPr lang="en-US" dirty="0"/>
           </a:p>
@@ -4547,107 +4865,54 @@
         </p:nvSpPr>
         <p:spPr/>
         <p:txBody>
-          <a:bodyPr>
-            <a:normAutofit fontScale="92500" lnSpcReduction="20000"/>
-          </a:bodyPr>
-          <a:lstStyle/>
-          <a:p>
-            <a:r>
-              <a:rPr lang="sk-SK" dirty="0" smtClean="0"/>
-              <a:t>Nejaký predpis/scenár(angl. </a:t>
-            </a:r>
-            <a:r>
-              <a:rPr lang="sk-SK" dirty="0" err="1" smtClean="0"/>
-              <a:t>script</a:t>
-            </a:r>
-            <a:r>
-              <a:rPr lang="sk-SK" dirty="0" smtClean="0"/>
-              <a:t>), ktorý by sme nasledovali aby sme vedeli zopakovať celú procedúru</a:t>
-            </a:r>
-          </a:p>
-          <a:p>
-            <a:r>
-              <a:rPr lang="sk-SK" dirty="0" smtClean="0"/>
-              <a:t>Niečo, čo sa dá </a:t>
-            </a:r>
-            <a:r>
-              <a:rPr lang="sk-SK" b="1" dirty="0" smtClean="0"/>
-              <a:t>automatizovať </a:t>
-            </a:r>
-            <a:r>
-              <a:rPr lang="sk-SK" dirty="0" smtClean="0"/>
-              <a:t>aby sme to nemuseli robiť manuálne</a:t>
-            </a:r>
-          </a:p>
-          <a:p>
-            <a:pPr lvl="1"/>
-            <a:r>
-              <a:rPr lang="sk-SK" dirty="0" smtClean="0"/>
-              <a:t>Pri nových dátach</a:t>
-            </a:r>
-          </a:p>
-          <a:p>
-            <a:pPr lvl="1"/>
-            <a:r>
-              <a:rPr lang="sk-SK" dirty="0" smtClean="0"/>
-              <a:t>Pri malej zmene v predpise</a:t>
-            </a:r>
-            <a:endParaRPr lang="en-US" dirty="0" smtClean="0"/>
-          </a:p>
-          <a:p>
-            <a:r>
-              <a:rPr lang="sk-SK" dirty="0" smtClean="0"/>
-              <a:t>Voliteľné požiadavky:</a:t>
-            </a:r>
-          </a:p>
-          <a:p>
-            <a:pPr lvl="1"/>
-            <a:r>
-              <a:rPr lang="sk-SK" dirty="0" smtClean="0"/>
-              <a:t>Nechceme najskôr spraviť analýzu a potom z nej </a:t>
-            </a:r>
-            <a:r>
-              <a:rPr lang="sk-SK" b="1" dirty="0" smtClean="0"/>
-              <a:t>dodatočne</a:t>
-            </a:r>
-            <a:r>
-              <a:rPr lang="sk-SK" dirty="0" smtClean="0"/>
-              <a:t> vyrábať predpis. Chceme aby sme to vyrobili naraz a aby bolo toto vytváranie pohodlné a aby bolo súčasťou analýzy</a:t>
-            </a:r>
-          </a:p>
-          <a:p>
-            <a:pPr lvl="1"/>
-            <a:r>
-              <a:rPr lang="sk-SK" dirty="0" smtClean="0"/>
-              <a:t>Chceme priebežne vidieť medzivýsledky</a:t>
-            </a:r>
-          </a:p>
-          <a:p>
-            <a:pPr lvl="1"/>
-            <a:r>
-              <a:rPr lang="sk-SK" dirty="0" smtClean="0"/>
-              <a:t>Chceme komentáre </a:t>
-            </a:r>
-          </a:p>
-          <a:p>
-            <a:pPr lvl="2"/>
-            <a:r>
-              <a:rPr lang="sk-SK" dirty="0" smtClean="0"/>
-              <a:t>Nielen kódu ale aj výsledkov</a:t>
-            </a:r>
+          <a:bodyPr/>
+          <a:lstStyle/>
+          <a:p>
+            <a:r>
+              <a:rPr lang="sk-SK" dirty="0" smtClean="0"/>
+              <a:t>Celý postup musím opakovať znovu.</a:t>
+            </a:r>
+          </a:p>
+          <a:p>
+            <a:r>
+              <a:rPr lang="sk-SK" dirty="0" smtClean="0"/>
+              <a:t>Veľa manuálnej práce.</a:t>
+            </a:r>
+          </a:p>
+          <a:p>
+            <a:r>
+              <a:rPr lang="sk-SK" dirty="0" smtClean="0"/>
+              <a:t>Mám približnú predstavu ako som postupoval, ale nepamätám si to presne.</a:t>
+            </a:r>
+          </a:p>
+          <a:p>
+            <a:r>
+              <a:rPr lang="sk-SK" dirty="0" smtClean="0"/>
+              <a:t>Ten, komu som ten výsledok odovzdal nevie, čo som spravil s dátami na to aby som ho dosiahol.</a:t>
+            </a:r>
+          </a:p>
+          <a:p>
+            <a:endParaRPr lang="en-US" dirty="0"/>
           </a:p>
         </p:txBody>
       </p:sp>
     </p:spTree>
     <p:extLst>
       <p:ext uri="{BB962C8B-B14F-4D97-AF65-F5344CB8AC3E}">
-        <p14:creationId xmlns:p14="http://schemas.microsoft.com/office/powerpoint/2010/main" val="4131808958"/>
+        <p14:creationId xmlns:p14="http://schemas.microsoft.com/office/powerpoint/2010/main" val="2667502804"/>
       </p:ext>
     </p:extLst>
   </p:cSld>
   <p:clrMapOvr>
     <a:masterClrMapping/>
   </p:clrMapOvr>
+  <p:timing>
+    <p:tnLst>
+      <p:par>
+        <p:cTn id="1" dur="indefinite" restart="never" nodeType="tmRoot"/>
+      </p:par>
+    </p:tnLst>
+  </p:timing>
 </p:sld>
 </file>
 
@@ -4684,6 +4949,173 @@
           <a:lstStyle/>
           <a:p>
             <a:r>
+              <a:rPr lang="sk-SK" dirty="0"/>
+              <a:t>Č</a:t>
+            </a:r>
+            <a:r>
+              <a:rPr lang="sk-SK" dirty="0" smtClean="0"/>
+              <a:t>o by sme potrebovali</a:t>
+            </a:r>
+            <a:endParaRPr lang="en-US" dirty="0"/>
+          </a:p>
+        </p:txBody>
+      </p:sp>
+      <p:sp>
+        <p:nvSpPr>
+          <p:cNvPr id="3" name="Content Placeholder 2"/>
+          <p:cNvSpPr>
+            <a:spLocks noGrp="1"/>
+          </p:cNvSpPr>
+          <p:nvPr>
+            <p:ph idx="1"/>
+          </p:nvPr>
+        </p:nvSpPr>
+        <p:spPr/>
+        <p:txBody>
+          <a:bodyPr>
+            <a:normAutofit fontScale="92500" lnSpcReduction="20000"/>
+          </a:bodyPr>
+          <a:lstStyle/>
+          <a:p>
+            <a:r>
+              <a:rPr lang="sk-SK" dirty="0" smtClean="0"/>
+              <a:t>Nejaký predpis/scenár(angl. </a:t>
+            </a:r>
+            <a:r>
+              <a:rPr lang="sk-SK" dirty="0" err="1" smtClean="0"/>
+              <a:t>script</a:t>
+            </a:r>
+            <a:r>
+              <a:rPr lang="sk-SK" dirty="0" smtClean="0"/>
+              <a:t>), ktorý by sme nasledovali aby sme vedeli zopakovať celú procedúru</a:t>
+            </a:r>
+          </a:p>
+          <a:p>
+            <a:r>
+              <a:rPr lang="sk-SK" dirty="0" smtClean="0"/>
+              <a:t>Niečo, čo sa dá </a:t>
+            </a:r>
+            <a:r>
+              <a:rPr lang="sk-SK" b="1" dirty="0" smtClean="0"/>
+              <a:t>automatizovať </a:t>
+            </a:r>
+            <a:r>
+              <a:rPr lang="sk-SK" dirty="0" smtClean="0"/>
+              <a:t>aby sme to nemuseli robiť manuálne</a:t>
+            </a:r>
+          </a:p>
+          <a:p>
+            <a:pPr lvl="1"/>
+            <a:r>
+              <a:rPr lang="sk-SK" dirty="0" smtClean="0"/>
+              <a:t>Pri nových dátach</a:t>
+            </a:r>
+          </a:p>
+          <a:p>
+            <a:pPr lvl="1"/>
+            <a:r>
+              <a:rPr lang="sk-SK" dirty="0" smtClean="0"/>
+              <a:t>Pri malej zmene v predpise</a:t>
+            </a:r>
+            <a:endParaRPr lang="en-US" dirty="0" smtClean="0"/>
+          </a:p>
+          <a:p>
+            <a:r>
+              <a:rPr lang="sk-SK" dirty="0" smtClean="0"/>
+              <a:t>Voliteľné požiadavky:</a:t>
+            </a:r>
+          </a:p>
+          <a:p>
+            <a:pPr lvl="1"/>
+            <a:r>
+              <a:rPr lang="sk-SK" dirty="0" smtClean="0"/>
+              <a:t>Nechceme najskôr spraviť analýzu a potom z nej </a:t>
+            </a:r>
+            <a:r>
+              <a:rPr lang="sk-SK" b="1" dirty="0" smtClean="0"/>
+              <a:t>dodatočne</a:t>
+            </a:r>
+            <a:r>
+              <a:rPr lang="sk-SK" dirty="0" smtClean="0"/>
+              <a:t> vyrábať predpis. Chceme aby sme to vyrobili naraz a aby bolo toto vytváranie pohodlné a aby bolo súčasťou analýzy</a:t>
+            </a:r>
+          </a:p>
+          <a:p>
+            <a:pPr lvl="1"/>
+            <a:r>
+              <a:rPr lang="sk-SK" dirty="0" smtClean="0"/>
+              <a:t>Chceme priebežne vidieť medzivýsledky</a:t>
+            </a:r>
+          </a:p>
+          <a:p>
+            <a:pPr lvl="1"/>
+            <a:r>
+              <a:rPr lang="sk-SK" dirty="0" smtClean="0"/>
+              <a:t>Chceme komentáre </a:t>
+            </a:r>
+          </a:p>
+          <a:p>
+            <a:pPr lvl="2"/>
+            <a:r>
+              <a:rPr lang="sk-SK" dirty="0" smtClean="0"/>
+              <a:t>Nielen kódu ale aj výsledkov</a:t>
+            </a:r>
+          </a:p>
+        </p:txBody>
+      </p:sp>
+    </p:spTree>
+    <p:extLst>
+      <p:ext uri="{BB962C8B-B14F-4D97-AF65-F5344CB8AC3E}">
+        <p14:creationId xmlns:p14="http://schemas.microsoft.com/office/powerpoint/2010/main" val="4131808958"/>
+      </p:ext>
+    </p:extLst>
+  </p:cSld>
+  <p:clrMapOvr>
+    <a:masterClrMapping/>
+  </p:clrMapOvr>
+  <p:timing>
+    <p:tnLst>
+      <p:par>
+        <p:cTn id="1" dur="indefinite" restart="never" nodeType="tmRoot"/>
+      </p:par>
+    </p:tnLst>
+  </p:timing>
+</p:sld>
+</file>
+
+<file path=ppt/slides/slide8.xml><?xml version="1.0" encoding="utf-8"?>
+<p:sld xmlns:a="http://schemas.openxmlformats.org/drawingml/2006/main" xmlns:r="http://schemas.openxmlformats.org/officeDocument/2006/relationships" xmlns:p="http://schemas.openxmlformats.org/presentationml/2006/main">
+  <p:cSld>
+    <p:spTree>
+      <p:nvGrpSpPr>
+        <p:cNvPr id="1" name=""/>
+        <p:cNvGrpSpPr/>
+        <p:nvPr/>
+      </p:nvGrpSpPr>
+      <p:grpSpPr>
+        <a:xfrm>
+          <a:off x="0" y="0"/>
+          <a:ext cx="0" cy="0"/>
+          <a:chOff x="0" y="0"/>
+          <a:chExt cx="0" cy="0"/>
+        </a:xfrm>
+      </p:grpSpPr>
+      <p:sp>
+        <p:nvSpPr>
+          <p:cNvPr id="2" name="Title 1"/>
+          <p:cNvSpPr>
+            <a:spLocks noGrp="1"/>
+          </p:cNvSpPr>
+          <p:nvPr>
+            <p:ph type="title"/>
+          </p:nvPr>
+        </p:nvSpPr>
+        <p:spPr/>
+        <p:txBody>
+          <a:bodyPr/>
+          <a:lstStyle/>
+          <a:p>
+            <a:r>
               <a:rPr lang="sk-SK" dirty="0" smtClean="0"/>
               <a:t>Možné riešenia</a:t>
             </a:r>
@@ -4769,10 +5201,17 @@
   <p:clrMapOvr>
     <a:masterClrMapping/>
   </p:clrMapOvr>
+  <p:timing>
+    <p:tnLst>
+      <p:par>
+        <p:cTn id="1" dur="indefinite" restart="never" nodeType="tmRoot"/>
+      </p:par>
+    </p:tnLst>
+  </p:timing>
 </p:sld>
 </file>
 
-<file path=ppt/slides/slide8.xml><?xml version="1.0" encoding="utf-8"?>
+<file path=ppt/slides/slide9.xml><?xml version="1.0" encoding="utf-8"?>
 <p:sld xmlns:a="http://schemas.openxmlformats.org/drawingml/2006/main" xmlns:r="http://schemas.openxmlformats.org/officeDocument/2006/relationships" xmlns:p="http://schemas.openxmlformats.org/presentationml/2006/main">
   <p:cSld>
     <p:spTree>
@@ -4938,214 +5377,13 @@
   <p:clrMapOvr>
     <a:masterClrMapping/>
   </p:clrMapOvr>
-</p:sld>
-</file>
-
-<file path=ppt/slides/slide9.xml><?xml version="1.0" encoding="utf-8"?>
-<p:sld xmlns:a="http://schemas.openxmlformats.org/drawingml/2006/main" xmlns:r="http://schemas.openxmlformats.org/officeDocument/2006/relationships" xmlns:p="http://schemas.openxmlformats.org/presentationml/2006/main">
-  <p:cSld>
-    <p:spTree>
-      <p:nvGrpSpPr>
-        <p:cNvPr id="1" name=""/>
-        <p:cNvGrpSpPr/>
-        <p:nvPr/>
-      </p:nvGrpSpPr>
-      <p:grpSpPr>
-        <a:xfrm>
-          <a:off x="0" y="0"/>
-          <a:ext cx="0" cy="0"/>
-          <a:chOff x="0" y="0"/>
-          <a:chExt cx="0" cy="0"/>
-        </a:xfrm>
-      </p:grpSpPr>
-      <p:sp>
-        <p:nvSpPr>
-          <p:cNvPr id="2" name="Title 1"/>
-          <p:cNvSpPr>
-            <a:spLocks noGrp="1"/>
-          </p:cNvSpPr>
-          <p:nvPr>
-            <p:ph type="title"/>
-          </p:nvPr>
-        </p:nvSpPr>
-        <p:spPr/>
-        <p:txBody>
-          <a:bodyPr/>
-          <a:lstStyle/>
-          <a:p>
-            <a:r>
-              <a:rPr lang="sk-SK" dirty="0" smtClean="0"/>
-              <a:t>Príklad </a:t>
-            </a:r>
-            <a:r>
-              <a:rPr lang="sk-SK" dirty="0" err="1" smtClean="0"/>
-              <a:t>Jupyter</a:t>
-            </a:r>
-            <a:r>
-              <a:rPr lang="sk-SK" dirty="0" smtClean="0"/>
-              <a:t> notebooku</a:t>
-            </a:r>
-            <a:endParaRPr lang="en-US" dirty="0"/>
-          </a:p>
-        </p:txBody>
-      </p:sp>
-      <p:sp>
-        <p:nvSpPr>
-          <p:cNvPr id="3" name="Content Placeholder 2"/>
-          <p:cNvSpPr>
-            <a:spLocks noGrp="1"/>
-          </p:cNvSpPr>
-          <p:nvPr>
-            <p:ph idx="1"/>
-          </p:nvPr>
-        </p:nvSpPr>
-        <p:spPr/>
-        <p:txBody>
-          <a:bodyPr/>
-          <a:lstStyle/>
-          <a:p>
-            <a:pPr marL="0" indent="0">
-              <a:buNone/>
-            </a:pPr>
-            <a:r>
-              <a:rPr lang="sk-SK" dirty="0" err="1" smtClean="0"/>
-              <a:t>Repo</a:t>
-            </a:r>
-            <a:r>
-              <a:rPr lang="en-GB" dirty="0" smtClean="0"/>
-              <a:t>z</a:t>
-            </a:r>
-            <a:r>
-              <a:rPr lang="sk-SK" dirty="0" err="1" smtClean="0"/>
-              <a:t>itár</a:t>
-            </a:r>
-            <a:r>
-              <a:rPr lang="sk-SK" dirty="0" smtClean="0"/>
-              <a:t>: </a:t>
-            </a:r>
-            <a:r>
-              <a:rPr lang="en-US" dirty="0" smtClean="0">
-                <a:hlinkClick r:id="rId2"/>
-              </a:rPr>
-              <a:t>https://github.com/donnemartin/data-science-ipython-notebooks</a:t>
-            </a:r>
-            <a:endParaRPr lang="en-US" dirty="0" smtClean="0"/>
-          </a:p>
-          <a:p>
-            <a:pPr marL="0" indent="0">
-              <a:buNone/>
-            </a:pPr>
-            <a:r>
-              <a:rPr lang="sk-SK" dirty="0" smtClean="0"/>
-              <a:t>Notebook: </a:t>
-            </a:r>
-            <a:r>
-              <a:rPr lang="sk-SK" dirty="0" smtClean="0">
-                <a:hlinkClick r:id="rId3"/>
-              </a:rPr>
-              <a:t>https://github.com/donnemartin/data-science-ipython-notebooks/blob/master/kaggle/titanic.ipynb</a:t>
-            </a:r>
-            <a:endParaRPr lang="en-GB" dirty="0" smtClean="0"/>
-          </a:p>
-          <a:p>
-            <a:pPr marL="0" indent="0">
-              <a:buNone/>
-            </a:pPr>
-            <a:endParaRPr lang="sk-SK" dirty="0" smtClean="0"/>
-          </a:p>
-          <a:p>
-            <a:pPr marL="0" indent="0">
-              <a:buNone/>
-            </a:pPr>
-            <a:endParaRPr lang="en-GB" dirty="0"/>
-          </a:p>
-          <a:p>
-            <a:pPr marL="0" indent="0">
-              <a:buNone/>
-            </a:pPr>
-            <a:r>
-              <a:rPr lang="en-GB" sz="1800" dirty="0" err="1" smtClean="0"/>
-              <a:t>Namiesto</a:t>
-            </a:r>
-            <a:r>
-              <a:rPr lang="en-GB" sz="1800" dirty="0" smtClean="0"/>
-              <a:t> python 2 </a:t>
-            </a:r>
-            <a:r>
-              <a:rPr lang="en-GB" sz="1800" dirty="0" err="1" smtClean="0"/>
-              <a:t>pou</a:t>
-            </a:r>
-            <a:r>
-              <a:rPr lang="sk-SK" sz="1800" dirty="0" err="1" smtClean="0"/>
-              <a:t>ží</a:t>
-            </a:r>
-            <a:r>
-              <a:rPr lang="en-GB" sz="1800" dirty="0" err="1" smtClean="0"/>
-              <a:t>vam</a:t>
-            </a:r>
-            <a:r>
-              <a:rPr lang="en-GB" sz="1800" dirty="0" smtClean="0"/>
-              <a:t> python 3 a </a:t>
-            </a:r>
-            <a:r>
-              <a:rPr lang="sk-SK" sz="1800" dirty="0" smtClean="0"/>
-              <a:t>pridal som riadok</a:t>
-            </a:r>
-          </a:p>
-          <a:p>
-            <a:pPr marL="0" indent="0">
-              <a:buNone/>
-            </a:pPr>
-            <a:r>
-              <a:rPr lang="sk-SK" sz="1800" dirty="0" smtClean="0">
-                <a:latin typeface="Consolas" panose="020B0609020204030204" pitchFamily="49" charset="0"/>
-              </a:rPr>
-              <a:t>%</a:t>
-            </a:r>
-            <a:r>
-              <a:rPr lang="sk-SK" sz="1800" dirty="0" err="1" smtClean="0">
-                <a:latin typeface="Consolas" panose="020B0609020204030204" pitchFamily="49" charset="0"/>
-              </a:rPr>
-              <a:t>matplotlib</a:t>
-            </a:r>
-            <a:r>
-              <a:rPr lang="sk-SK" sz="1800" dirty="0" smtClean="0">
-                <a:latin typeface="Consolas" panose="020B0609020204030204" pitchFamily="49" charset="0"/>
-              </a:rPr>
-              <a:t> </a:t>
-            </a:r>
-            <a:r>
-              <a:rPr lang="sk-SK" sz="1800" dirty="0" err="1" smtClean="0">
-                <a:latin typeface="Consolas" panose="020B0609020204030204" pitchFamily="49" charset="0"/>
-              </a:rPr>
-              <a:t>inline</a:t>
-            </a:r>
-            <a:endParaRPr lang="sk-SK" sz="1800" dirty="0">
-              <a:latin typeface="Consolas" panose="020B0609020204030204" pitchFamily="49" charset="0"/>
-            </a:endParaRPr>
-          </a:p>
-          <a:p>
-            <a:pPr marL="0" indent="0">
-              <a:buNone/>
-            </a:pPr>
-            <a:r>
-              <a:rPr lang="sk-SK" sz="1800" dirty="0" smtClean="0"/>
-              <a:t>za načítanie knižníc</a:t>
-            </a:r>
-            <a:endParaRPr lang="en-US" sz="1800" dirty="0"/>
-          </a:p>
-        </p:txBody>
-      </p:sp>
-    </p:spTree>
-    <p:extLst>
-      <p:ext uri="{BB962C8B-B14F-4D97-AF65-F5344CB8AC3E}">
-        <p14:creationId xmlns:p14="http://schemas.microsoft.com/office/powerpoint/2010/main" val="3134723897"/>
-      </p:ext>
-    </p:extLst>
-  </p:cSld>
-  <p:clrMapOvr>
-    <a:masterClrMapping/>
-  </p:clrMapOvr>
+  <p:timing>
+    <p:tnLst>
+      <p:par>
+        <p:cTn id="1" dur="indefinite" restart="never" nodeType="tmRoot"/>
+      </p:par>
+    </p:tnLst>
+  </p:timing>
 </p:sld>
 </file>
 

</xml_diff>